<commit_message>
primer cambio a objeto 1
-------
</commit_message>
<xml_diff>
--- a/objeto 1.pptx
+++ b/objeto 1.pptx
@@ -104,6 +104,11 @@
       </a:defRPr>
     </a:lvl9pPr>
   </p:defaultTextStyle>
+  <p:extLst>
+    <p:ext uri="{EFAFB233-063F-42B5-8137-9DF3F51BA10A}">
+      <p15:sldGuideLst xmlns:p15="http://schemas.microsoft.com/office/powerpoint/2012/main"/>
+    </p:ext>
+  </p:extLst>
 </p:presentation>
 </file>
 
@@ -2981,11 +2986,7 @@
           <a:p>
             <a:r>
               <a:rPr lang="es-MX" dirty="0" smtClean="0"/>
-              <a:t>Creación </a:t>
-            </a:r>
-            <a:r>
-              <a:rPr lang="es-MX" smtClean="0"/>
-              <a:t>de objeto</a:t>
+              <a:t>Creación de objeto</a:t>
             </a:r>
             <a:endParaRPr lang="es-MX" dirty="0"/>
           </a:p>
@@ -3006,7 +3007,11 @@
           <a:bodyPr/>
           <a:lstStyle/>
           <a:p>
-            <a:endParaRPr lang="es-MX"/>
+            <a:r>
+              <a:rPr lang="es-MX" dirty="0" smtClean="0"/>
+              <a:t>Primer modificación</a:t>
+            </a:r>
+            <a:endParaRPr lang="es-MX" dirty="0"/>
           </a:p>
         </p:txBody>
       </p:sp>

</xml_diff>

<commit_message>
Revert "primer cambio a objeto 1"
</commit_message>
<xml_diff>
--- a/objeto 1.pptx
+++ b/objeto 1.pptx
@@ -104,11 +104,6 @@
       </a:defRPr>
     </a:lvl9pPr>
   </p:defaultTextStyle>
-  <p:extLst>
-    <p:ext uri="{EFAFB233-063F-42B5-8137-9DF3F51BA10A}">
-      <p15:sldGuideLst xmlns:p15="http://schemas.microsoft.com/office/powerpoint/2012/main"/>
-    </p:ext>
-  </p:extLst>
 </p:presentation>
 </file>
 
@@ -2986,7 +2981,11 @@
           <a:p>
             <a:r>
               <a:rPr lang="es-MX" dirty="0" smtClean="0"/>
-              <a:t>Creación de objeto</a:t>
+              <a:t>Creación </a:t>
+            </a:r>
+            <a:r>
+              <a:rPr lang="es-MX" smtClean="0"/>
+              <a:t>de objeto</a:t>
             </a:r>
             <a:endParaRPr lang="es-MX" dirty="0"/>
           </a:p>
@@ -3007,11 +3006,7 @@
           <a:bodyPr/>
           <a:lstStyle/>
           <a:p>
-            <a:r>
-              <a:rPr lang="es-MX" dirty="0" smtClean="0"/>
-              <a:t>Primer modificación</a:t>
-            </a:r>
-            <a:endParaRPr lang="es-MX" dirty="0"/>
+            <a:endParaRPr lang="es-MX"/>
           </a:p>
         </p:txBody>
       </p:sp>

</xml_diff>